<commit_message>
Slides updates before recording
</commit_message>
<xml_diff>
--- a/unit_00/bootstrap/slides/01 Intro to Bootstrap.pptx
+++ b/unit_00/bootstrap/slides/01 Intro to Bootstrap.pptx
@@ -3628,7 +3628,7 @@
           <a:p>
             <a:fld id="{EA0C0817-A112-4847-8014-A94B7D2A4EA3}" type="datetime1">
               <a:rPr lang="en-US" smtClean="0"/>
-              <a:t>6/30/2020</a:t>
+              <a:t>8/27/2020</a:t>
             </a:fld>
             <a:endParaRPr lang="en-US" dirty="0"/>
           </a:p>
@@ -3830,7 +3830,7 @@
           <a:p>
             <a:fld id="{7332B432-ACDA-4023-A761-2BAB76577B62}" type="datetime1">
               <a:rPr lang="en-US" smtClean="0"/>
-              <a:t>6/30/2020</a:t>
+              <a:t>8/27/2020</a:t>
             </a:fld>
             <a:endParaRPr lang="en-US" dirty="0"/>
           </a:p>
@@ -4429,7 +4429,7 @@
           <a:p>
             <a:fld id="{D9C646AA-F36E-4540-911D-FFFC0A0EF24A}" type="datetime1">
               <a:rPr lang="en-US" smtClean="0"/>
-              <a:t>6/30/2020</a:t>
+              <a:t>8/27/2020</a:t>
             </a:fld>
             <a:endParaRPr lang="en-US" dirty="0"/>
           </a:p>
@@ -4749,7 +4749,7 @@
           <a:p>
             <a:fld id="{69186D26-FA5F-4637-B602-B7C2DC34CFD4}" type="datetime1">
               <a:rPr lang="en-US" smtClean="0"/>
-              <a:t>6/30/2020</a:t>
+              <a:t>8/27/2020</a:t>
             </a:fld>
             <a:endParaRPr lang="en-US" dirty="0"/>
           </a:p>
@@ -5186,7 +5186,7 @@
           <a:p>
             <a:fld id="{8A7F15D8-96D1-4781-BC50-CA8A088B2FE4}" type="datetime1">
               <a:rPr lang="en-US" smtClean="0"/>
-              <a:t>6/30/2020</a:t>
+              <a:t>8/27/2020</a:t>
             </a:fld>
             <a:endParaRPr lang="en-US" dirty="0"/>
           </a:p>
@@ -5304,7 +5304,7 @@
           <a:p>
             <a:fld id="{F9A96C99-B8F8-4528-BD05-0E16E943DC09}" type="datetime1">
               <a:rPr lang="en-US" smtClean="0"/>
-              <a:t>6/30/2020</a:t>
+              <a:t>8/27/2020</a:t>
             </a:fld>
             <a:endParaRPr lang="en-US" dirty="0"/>
           </a:p>
@@ -5399,7 +5399,7 @@
           <a:p>
             <a:fld id="{03636942-C211-4B28-8DBD-C953E00AF71B}" type="datetime1">
               <a:rPr lang="en-US" smtClean="0"/>
-              <a:t>6/30/2020</a:t>
+              <a:t>8/27/2020</a:t>
             </a:fld>
             <a:endParaRPr lang="en-US" dirty="0"/>
           </a:p>
@@ -5816,7 +5816,7 @@
           <a:p>
             <a:fld id="{7E8D12A6-918A-48BD-8CB9-CA713993B0EA}" type="datetime1">
               <a:rPr lang="en-US" smtClean="0"/>
-              <a:t>6/30/2020</a:t>
+              <a:t>8/27/2020</a:t>
             </a:fld>
             <a:endParaRPr lang="en-US" dirty="0"/>
           </a:p>
@@ -6078,7 +6078,7 @@
             <a:fld id="{E778CE86-875F-4587-BCF6-FA054AFC0D53}" type="datetime1">
               <a:rPr lang="en-US" smtClean="0"/>
               <a:pPr/>
-              <a:t>6/30/2020</a:t>
+              <a:t>8/27/2020</a:t>
             </a:fld>
             <a:endParaRPr lang="en-US" dirty="0"/>
           </a:p>
@@ -6594,7 +6594,7 @@
           <a:p>
             <a:fld id="{F6FA2B21-3FCD-4721-B95C-427943F61125}" type="datetime1">
               <a:rPr lang="en-US" smtClean="0"/>
-              <a:t>6/30/2020</a:t>
+              <a:t>8/27/2020</a:t>
             </a:fld>
             <a:endParaRPr lang="en-US" dirty="0"/>
           </a:p>
@@ -7419,7 +7419,7 @@
               <a:rPr lang="en-US" sz="1600">
                 <a:latin typeface="Consolas" panose="020B0609020204030204" pitchFamily="49" charset="0"/>
               </a:rPr>
-              <a:t>      href="https://stackpath.bootstrapcdn.com/</a:t>
+              <a:t>      href="</a:t>
             </a:r>
             <a:r>
               <a:rPr lang="en-US" sz="1600">
@@ -7428,7 +7428,7 @@
                 </a:highlight>
                 <a:latin typeface="Consolas" panose="020B0609020204030204" pitchFamily="49" charset="0"/>
               </a:rPr>
-              <a:t>bootstrap/4.5.0/css/bootstrap.min.css</a:t>
+              <a:t>https://stackpath.bootstrapcdn.com/bootstrap/4.5.0/css/bootstrap.min.css</a:t>
             </a:r>
             <a:r>
               <a:rPr lang="en-US" sz="1600">
@@ -7654,25 +7654,7 @@
                 </a:highlight>
                 <a:latin typeface="Consolas" panose="020B0609020204030204" pitchFamily="49" charset="0"/>
               </a:rPr>
-              <a:t>https:</a:t>
-            </a:r>
-            <a:r>
-              <a:rPr lang="en-US" sz="1600">
-                <a:highlight>
-                  <a:srgbClr val="FCF7F1"/>
-                </a:highlight>
-                <a:latin typeface="Consolas" panose="020B0609020204030204" pitchFamily="49" charset="0"/>
-              </a:rPr>
-              <a:t>//code.jquery.com/jquery-</a:t>
-            </a:r>
-            <a:r>
-              <a:rPr lang="en-US" sz="1600">
-                <a:highlight>
-                  <a:srgbClr val="F8D22F"/>
-                </a:highlight>
-                <a:latin typeface="Consolas" panose="020B0609020204030204" pitchFamily="49" charset="0"/>
-              </a:rPr>
-              <a:t>3.5.1.min.js</a:t>
+              <a:t>https://code.jquery.com/jquery-3.5.1.min.js</a:t>
             </a:r>
             <a:r>
               <a:rPr lang="en-US" sz="1600">
@@ -7758,7 +7740,7 @@
               <a:rPr lang="en-US" sz="1600">
                 <a:latin typeface="Consolas" panose="020B0609020204030204" pitchFamily="49" charset="0"/>
               </a:rPr>
-              <a:t>&lt;script src="https://cdn.jsdelivr.net/npm/</a:t>
+              <a:t>&lt;script src="</a:t>
             </a:r>
             <a:r>
               <a:rPr lang="en-US" sz="1600">
@@ -7767,7 +7749,7 @@
                 </a:highlight>
                 <a:latin typeface="Consolas" panose="020B0609020204030204" pitchFamily="49" charset="0"/>
               </a:rPr>
-              <a:t>popper.js@1.16.0/dist/umd/popper.min.js</a:t>
+              <a:t>https://cdn.jsdelivr.net/npm/popper.js@1.16.0/dist/umd/popper.min.js</a:t>
             </a:r>
             <a:r>
               <a:rPr lang="en-US" sz="1600">
@@ -7838,7 +7820,7 @@
               <a:rPr lang="en-US" sz="1600">
                 <a:latin typeface="Consolas" panose="020B0609020204030204" pitchFamily="49" charset="0"/>
               </a:rPr>
-              <a:t>&lt;script src="https://stackpath.bootstrapcdn.com/</a:t>
+              <a:t>&lt;script src="</a:t>
             </a:r>
             <a:r>
               <a:rPr lang="en-US" sz="1600">
@@ -7847,7 +7829,7 @@
                 </a:highlight>
                 <a:latin typeface="Consolas" panose="020B0609020204030204" pitchFamily="49" charset="0"/>
               </a:rPr>
-              <a:t>bootstrap/4.5.0/js/bootstrap.min.js</a:t>
+              <a:t>https://stackpath.bootstrapcdn.com/bootstrap/4.5.0/js/bootstrap.min.js</a:t>
             </a:r>
             <a:r>
               <a:rPr lang="en-US" sz="1600">
@@ -7958,6 +7940,55 @@
                 <a:srgbClr val="00B0F0"/>
               </a:solidFill>
             </a:endParaRPr>
+          </a:p>
+        </p:txBody>
+      </p:sp>
+      <p:sp>
+        <p:nvSpPr>
+          <p:cNvPr id="4" name="TextBox 3">
+            <a:extLst>
+              <a:ext uri="{FF2B5EF4-FFF2-40B4-BE49-F238E27FC236}">
+                <a16:creationId xmlns:a16="http://schemas.microsoft.com/office/drawing/2014/main" id="{252FF33C-23A1-4DFC-8A9B-2CAD64A10764}"/>
+              </a:ext>
+            </a:extLst>
+          </p:cNvPr>
+          <p:cNvSpPr txBox="1"/>
+          <p:nvPr/>
+        </p:nvSpPr>
+        <p:spPr>
+          <a:xfrm>
+            <a:off x="7984222" y="4844055"/>
+            <a:ext cx="3691156" cy="646331"/>
+          </a:xfrm>
+          <a:prstGeom prst="rect">
+            <a:avLst/>
+          </a:prstGeom>
+          <a:noFill/>
+        </p:spPr>
+        <p:txBody>
+          <a:bodyPr wrap="square" rtlCol="0">
+            <a:spAutoFit/>
+          </a:bodyPr>
+          <a:lstStyle/>
+          <a:p>
+            <a:r>
+              <a:rPr lang="en-US">
+                <a:highlight>
+                  <a:srgbClr val="F8D22F"/>
+                </a:highlight>
+              </a:rPr>
+              <a:t>* Get the full version of jQuery, </a:t>
+            </a:r>
+          </a:p>
+          <a:p>
+            <a:r>
+              <a:rPr lang="en-US">
+                <a:highlight>
+                  <a:srgbClr val="F8D22F"/>
+                </a:highlight>
+              </a:rPr>
+              <a:t>not the slim version!</a:t>
+            </a:r>
           </a:p>
         </p:txBody>
       </p:sp>
@@ -13545,7 +13576,7 @@
         </p:blipFill>
         <p:spPr>
           <a:xfrm>
-            <a:off x="7837989" y="4652740"/>
+            <a:off x="6361526" y="4550055"/>
             <a:ext cx="1371601" cy="1371601"/>
           </a:xfrm>
           <a:prstGeom prst="ellipse">
@@ -13593,7 +13624,7 @@
         </p:blipFill>
         <p:spPr>
           <a:xfrm>
-            <a:off x="9481594" y="4652739"/>
+            <a:off x="7945862" y="4550054"/>
             <a:ext cx="1371602" cy="1371602"/>
           </a:xfrm>
           <a:prstGeom prst="ellipse">
@@ -19431,15 +19462,6 @@
 </file>
 
 <file path=customXml/item1.xml><?xml version="1.0" encoding="utf-8"?>
-<p:properties xmlns:p="http://schemas.microsoft.com/office/2006/metadata/properties" xmlns:xsi="http://www.w3.org/2001/XMLSchema-instance" xmlns:pc="http://schemas.microsoft.com/office/infopath/2007/PartnerControls">
-  <documentManagement>
-    <Status xmlns="71af3243-3dd4-4a8d-8c0d-dd76da1f02a5">Not started</Status>
-    <MediaServiceKeyPoints xmlns="71af3243-3dd4-4a8d-8c0d-dd76da1f02a5" xsi:nil="true"/>
-  </documentManagement>
-</p:properties>
-</file>
-
-<file path=customXml/item2.xml><?xml version="1.0" encoding="utf-8"?>
 <?mso-contentType ?>
 <FormTemplates xmlns="http://schemas.microsoft.com/sharepoint/v3/contenttype/forms">
   <Display>DocumentLibraryForm</Display>
@@ -19448,7 +19470,7 @@
 </FormTemplates>
 </file>
 
-<file path=customXml/item3.xml><?xml version="1.0" encoding="utf-8"?>
+<file path=customXml/item2.xml><?xml version="1.0" encoding="utf-8"?>
 <ct:contentTypeSchema xmlns:ct="http://schemas.microsoft.com/office/2006/metadata/contentType" xmlns:ma="http://schemas.microsoft.com/office/2006/metadata/properties/metaAttributes" ct:_="" ma:_="" ma:contentTypeName="Document" ma:contentTypeID="0x01010079F111ED35F8CC479449609E8A0923A6" ma:contentTypeVersion="12" ma:contentTypeDescription="Create a new document." ma:contentTypeScope="" ma:versionID="a410dd7f93c95333ffa1b60ed6adedd1">
   <xsd:schema xmlns:xsd="http://www.w3.org/2001/XMLSchema" xmlns:xs="http://www.w3.org/2001/XMLSchema" xmlns:p="http://schemas.microsoft.com/office/2006/metadata/properties" xmlns:ns2="71af3243-3dd4-4a8d-8c0d-dd76da1f02a5" xmlns:ns3="16c05727-aa75-4e4a-9b5f-8a80a1165891" targetNamespace="http://schemas.microsoft.com/office/2006/metadata/properties" ma:root="true" ma:fieldsID="a936d9baba76aa3866493feff160faab" ns2:_="" ns3:_="">
     <xsd:import namespace="71af3243-3dd4-4a8d-8c0d-dd76da1f02a5"/>
@@ -19669,17 +19691,16 @@
 </ct:contentTypeSchema>
 </file>
 
-<file path=customXml/itemProps1.xml><?xml version="1.0" encoding="utf-8"?>
-<ds:datastoreItem xmlns:ds="http://schemas.openxmlformats.org/officeDocument/2006/customXml" ds:itemID="{137651BA-F45C-4845-9AB3-E0A65B39F5E1}">
-  <ds:schemaRefs>
-    <ds:schemaRef ds:uri="http://schemas.microsoft.com/office/2006/metadata/properties"/>
-    <ds:schemaRef ds:uri="http://schemas.microsoft.com/office/infopath/2007/PartnerControls"/>
-    <ds:schemaRef ds:uri="71af3243-3dd4-4a8d-8c0d-dd76da1f02a5"/>
-  </ds:schemaRefs>
-</ds:datastoreItem>
+<file path=customXml/item3.xml><?xml version="1.0" encoding="utf-8"?>
+<p:properties xmlns:p="http://schemas.microsoft.com/office/2006/metadata/properties" xmlns:xsi="http://www.w3.org/2001/XMLSchema-instance" xmlns:pc="http://schemas.microsoft.com/office/infopath/2007/PartnerControls">
+  <documentManagement>
+    <Status xmlns="71af3243-3dd4-4a8d-8c0d-dd76da1f02a5">Not started</Status>
+    <MediaServiceKeyPoints xmlns="71af3243-3dd4-4a8d-8c0d-dd76da1f02a5" xsi:nil="true"/>
+  </documentManagement>
+</p:properties>
 </file>
 
-<file path=customXml/itemProps2.xml><?xml version="1.0" encoding="utf-8"?>
+<file path=customXml/itemProps1.xml><?xml version="1.0" encoding="utf-8"?>
 <ds:datastoreItem xmlns:ds="http://schemas.openxmlformats.org/officeDocument/2006/customXml" ds:itemID="{CDB58277-F8DF-46FF-84EC-EF41B835E69F}">
   <ds:schemaRefs>
     <ds:schemaRef ds:uri="http://schemas.microsoft.com/sharepoint/v3/contenttype/forms"/>
@@ -19687,7 +19708,7 @@
 </ds:datastoreItem>
 </file>
 
-<file path=customXml/itemProps3.xml><?xml version="1.0" encoding="utf-8"?>
+<file path=customXml/itemProps2.xml><?xml version="1.0" encoding="utf-8"?>
 <ds:datastoreItem xmlns:ds="http://schemas.openxmlformats.org/officeDocument/2006/customXml" ds:itemID="{2D276E62-80A3-44DD-9BCC-97ED2B99B57F}">
   <ds:schemaRefs>
     <ds:schemaRef ds:uri="http://schemas.microsoft.com/office/2006/metadata/contentType"/>
@@ -19704,4 +19725,14 @@
     <ds:schemaRef ds:uri="http://schemas.microsoft.com/internal/obd"/>
   </ds:schemaRefs>
 </ds:datastoreItem>
+</file>
+
+<file path=customXml/itemProps3.xml><?xml version="1.0" encoding="utf-8"?>
+<ds:datastoreItem xmlns:ds="http://schemas.openxmlformats.org/officeDocument/2006/customXml" ds:itemID="{137651BA-F45C-4845-9AB3-E0A65B39F5E1}">
+  <ds:schemaRefs>
+    <ds:schemaRef ds:uri="http://schemas.microsoft.com/office/2006/metadata/properties"/>
+    <ds:schemaRef ds:uri="http://schemas.microsoft.com/office/infopath/2007/PartnerControls"/>
+    <ds:schemaRef ds:uri="71af3243-3dd4-4a8d-8c0d-dd76da1f02a5"/>
+  </ds:schemaRefs>
+</ds:datastoreItem>
 </file>
</xml_diff>